<commit_message>
Add input data sample
</commit_message>
<xml_diff>
--- a/Docs/Tweets Analysis.pptx
+++ b/Docs/Tweets Analysis.pptx
@@ -7636,6 +7636,10 @@
             <a:r>
               <a:rPr lang="en-US" dirty="0" err="1"/>
               <a:t>Jiechen</a:t>
+            </a:r>
+            <a:r>
+              <a:rPr lang="x-none" altLang="en-US" dirty="0" err="1"/>
+              <a:t>g</a:t>
             </a:r>
             <a:r>
               <a:rPr lang="en-US" dirty="0"/>

</xml_diff>